<commit_message>
Site updated: 2017-09-25 20:38:47
</commit_message>
<xml_diff>
--- a/download/TCP实现点对点通讯.pptx
+++ b/download/TCP实现点对点通讯.pptx
@@ -14,11 +14,11 @@
     <p:sldId id="344" r:id="rId5"/>
     <p:sldId id="345" r:id="rId6"/>
     <p:sldId id="346" r:id="rId7"/>
-    <p:sldId id="347" r:id="rId8"/>
-    <p:sldId id="348" r:id="rId9"/>
-    <p:sldId id="349" r:id="rId10"/>
-    <p:sldId id="350" r:id="rId11"/>
-    <p:sldId id="351" r:id="rId12"/>
+    <p:sldId id="348" r:id="rId8"/>
+    <p:sldId id="349" r:id="rId9"/>
+    <p:sldId id="350" r:id="rId10"/>
+    <p:sldId id="351" r:id="rId11"/>
+    <p:sldId id="353" r:id="rId12"/>
     <p:sldId id="352" r:id="rId13"/>
     <p:sldId id="338" r:id="rId14"/>
   </p:sldIdLst>
@@ -1135,7 +1135,7 @@
     </p:spTree>
     <p:extLst>
       <p:ext uri="{BB962C8B-B14F-4D97-AF65-F5344CB8AC3E}">
-        <p14:creationId xmlns:p14="http://schemas.microsoft.com/office/powerpoint/2010/main" val="652126478"/>
+        <p14:creationId xmlns:p14="http://schemas.microsoft.com/office/powerpoint/2010/main" val="1891534799"/>
       </p:ext>
     </p:extLst>
   </p:cSld>
@@ -1260,7 +1260,7 @@
     </p:spTree>
     <p:extLst>
       <p:ext uri="{BB962C8B-B14F-4D97-AF65-F5344CB8AC3E}">
-        <p14:creationId xmlns:p14="http://schemas.microsoft.com/office/powerpoint/2010/main" val="1891534799"/>
+        <p14:creationId xmlns:p14="http://schemas.microsoft.com/office/powerpoint/2010/main" val="466750695"/>
       </p:ext>
     </p:extLst>
   </p:cSld>
@@ -2245,7 +2245,7 @@
     </p:spTree>
     <p:extLst>
       <p:ext uri="{BB962C8B-B14F-4D97-AF65-F5344CB8AC3E}">
-        <p14:creationId xmlns:p14="http://schemas.microsoft.com/office/powerpoint/2010/main" val="1596286547"/>
+        <p14:creationId xmlns:p14="http://schemas.microsoft.com/office/powerpoint/2010/main" val="1420629261"/>
       </p:ext>
     </p:extLst>
   </p:cSld>
@@ -2370,7 +2370,7 @@
     </p:spTree>
     <p:extLst>
       <p:ext uri="{BB962C8B-B14F-4D97-AF65-F5344CB8AC3E}">
-        <p14:creationId xmlns:p14="http://schemas.microsoft.com/office/powerpoint/2010/main" val="1420629261"/>
+        <p14:creationId xmlns:p14="http://schemas.microsoft.com/office/powerpoint/2010/main" val="1211651217"/>
       </p:ext>
     </p:extLst>
   </p:cSld>
@@ -2495,7 +2495,7 @@
     </p:spTree>
     <p:extLst>
       <p:ext uri="{BB962C8B-B14F-4D97-AF65-F5344CB8AC3E}">
-        <p14:creationId xmlns:p14="http://schemas.microsoft.com/office/powerpoint/2010/main" val="1211651217"/>
+        <p14:creationId xmlns:p14="http://schemas.microsoft.com/office/powerpoint/2010/main" val="652126478"/>
       </p:ext>
     </p:extLst>
   </p:cSld>
@@ -7819,7 +7819,7 @@
         <p:spPr>
           <a:xfrm>
             <a:off x="2845837" y="830425"/>
-            <a:ext cx="4115229" cy="461665"/>
+            <a:ext cx="3316934" cy="523220"/>
           </a:xfrm>
           <a:prstGeom prst="rect">
             <a:avLst/>
@@ -7833,30 +7833,21 @@
           <a:lstStyle/>
           <a:p>
             <a:r>
-              <a:rPr lang="zh-CN" altLang="en-US" sz="2400" kern="1800" dirty="0">
-                <a:solidFill>
-                  <a:schemeClr val="bg1"/>
-                </a:solidFill>
-                <a:latin typeface="Times New Roman"/>
-                <a:ea typeface="黑体"/>
-              </a:rPr>
-              <a:t>连接目标网络服务器</a:t>
-            </a:r>
-            <a:r>
-              <a:rPr lang="en-US" altLang="zh-CN" sz="2400" kern="1800" dirty="0">
-                <a:solidFill>
-                  <a:schemeClr val="bg1"/>
-                </a:solidFill>
-                <a:latin typeface="Times New Roman"/>
-                <a:ea typeface="黑体"/>
-              </a:rPr>
-              <a:t>connect()</a:t>
-            </a:r>
-            <a:endParaRPr lang="en-US" altLang="zh-CN" sz="2400" dirty="0">
-              <a:solidFill>
-                <a:schemeClr val="bg1"/>
-              </a:solidFill>
-            </a:endParaRPr>
+              <a:rPr lang="zh-CN" altLang="en-US" sz="2800" dirty="0">
+                <a:solidFill>
+                  <a:schemeClr val="bg1"/>
+                </a:solidFill>
+              </a:rPr>
+              <a:t>写入数据函数</a:t>
+            </a:r>
+            <a:r>
+              <a:rPr lang="en-US" altLang="zh-CN" sz="2800" dirty="0">
+                <a:solidFill>
+                  <a:schemeClr val="bg1"/>
+                </a:solidFill>
+              </a:rPr>
+              <a:t>write()</a:t>
+            </a:r>
           </a:p>
         </p:txBody>
       </p:sp>
@@ -7883,23 +7874,26 @@
           <a:p>
             <a:pPr marR="0" lvl="0" rtl="0"/>
             <a:r>
+              <a:rPr lang="en-US" altLang="zh-CN" sz="2400" dirty="0" err="1">
+                <a:solidFill>
+                  <a:schemeClr val="bg1"/>
+                </a:solidFill>
+                <a:latin typeface="Times New Roman"/>
+              </a:rPr>
+              <a:t>int</a:t>
+            </a:r>
+            <a:r>
               <a:rPr lang="en-US" altLang="zh-CN" sz="2400" dirty="0">
                 <a:solidFill>
                   <a:schemeClr val="bg1"/>
                 </a:solidFill>
                 <a:latin typeface="Times New Roman"/>
               </a:rPr>
-              <a:t>#include &lt;sys/</a:t>
-            </a:r>
-            <a:r>
-              <a:rPr lang="en-US" altLang="zh-CN" sz="2400" dirty="0" err="1">
-                <a:solidFill>
-                  <a:schemeClr val="bg1"/>
-                </a:solidFill>
-                <a:latin typeface="Times New Roman"/>
-              </a:rPr>
-              <a:t>types.h</a:t>
-            </a:r>
+              <a:t> size ;</a:t>
+            </a:r>
+          </a:p>
+          <a:p>
+            <a:pPr marR="0" lvl="0" rtl="0"/>
             <a:r>
               <a:rPr lang="en-US" altLang="zh-CN" sz="2400" dirty="0">
                 <a:solidFill>
@@ -7907,7 +7901,7 @@
                 </a:solidFill>
                 <a:latin typeface="Times New Roman"/>
               </a:rPr>
-              <a:t>&gt;</a:t>
+              <a:t>char data[1024];</a:t>
             </a:r>
           </a:p>
           <a:p>
@@ -7919,172 +7913,7 @@
                 </a:solidFill>
                 <a:latin typeface="Times New Roman"/>
               </a:rPr>
-              <a:t>#include &lt;sys/</a:t>
-            </a:r>
-            <a:r>
-              <a:rPr lang="en-US" altLang="zh-CN" sz="2400" dirty="0" err="1">
-                <a:solidFill>
-                  <a:schemeClr val="bg1"/>
-                </a:solidFill>
-                <a:latin typeface="Times New Roman"/>
-              </a:rPr>
-              <a:t>socket.h</a:t>
-            </a:r>
-            <a:r>
-              <a:rPr lang="en-US" altLang="zh-CN" sz="2400" dirty="0">
-                <a:solidFill>
-                  <a:schemeClr val="bg1"/>
-                </a:solidFill>
-                <a:latin typeface="Times New Roman"/>
-              </a:rPr>
-              <a:t>&gt;</a:t>
-            </a:r>
-          </a:p>
-          <a:p>
-            <a:pPr marR="0" lvl="0" rtl="0"/>
-            <a:r>
-              <a:rPr lang="en-US" altLang="zh-CN" sz="2400" dirty="0" err="1">
-                <a:solidFill>
-                  <a:schemeClr val="bg1"/>
-                </a:solidFill>
-                <a:latin typeface="Times New Roman"/>
-              </a:rPr>
-              <a:t>int</a:t>
-            </a:r>
-            <a:r>
-              <a:rPr lang="en-US" altLang="zh-CN" sz="2400" dirty="0">
-                <a:solidFill>
-                  <a:schemeClr val="bg1"/>
-                </a:solidFill>
-                <a:latin typeface="Times New Roman"/>
-              </a:rPr>
-              <a:t> connect(</a:t>
-            </a:r>
-            <a:r>
-              <a:rPr lang="en-US" altLang="zh-CN" sz="2400" dirty="0" err="1">
-                <a:solidFill>
-                  <a:schemeClr val="bg1"/>
-                </a:solidFill>
-                <a:latin typeface="Times New Roman"/>
-              </a:rPr>
-              <a:t>int</a:t>
-            </a:r>
-            <a:r>
-              <a:rPr lang="en-US" altLang="zh-CN" sz="2400" dirty="0">
-                <a:solidFill>
-                  <a:schemeClr val="bg1"/>
-                </a:solidFill>
-                <a:latin typeface="Times New Roman"/>
-              </a:rPr>
-              <a:t> </a:t>
-            </a:r>
-            <a:r>
-              <a:rPr lang="en-US" altLang="zh-CN" sz="2400" dirty="0" err="1">
-                <a:solidFill>
-                  <a:schemeClr val="bg1"/>
-                </a:solidFill>
-                <a:latin typeface="Times New Roman"/>
-              </a:rPr>
-              <a:t>sockfd</a:t>
-            </a:r>
-            <a:r>
-              <a:rPr lang="en-US" altLang="zh-CN" sz="2400" dirty="0">
-                <a:solidFill>
-                  <a:schemeClr val="bg1"/>
-                </a:solidFill>
-                <a:latin typeface="Times New Roman"/>
-              </a:rPr>
-              <a:t>, </a:t>
-            </a:r>
-            <a:r>
-              <a:rPr lang="en-US" altLang="zh-CN" sz="2400" dirty="0" err="1">
-                <a:solidFill>
-                  <a:schemeClr val="bg1"/>
-                </a:solidFill>
-                <a:latin typeface="Times New Roman"/>
-              </a:rPr>
-              <a:t>struct</a:t>
-            </a:r>
-            <a:r>
-              <a:rPr lang="en-US" altLang="zh-CN" sz="2400" dirty="0">
-                <a:solidFill>
-                  <a:schemeClr val="bg1"/>
-                </a:solidFill>
-                <a:latin typeface="Times New Roman"/>
-              </a:rPr>
-              <a:t> </a:t>
-            </a:r>
-            <a:r>
-              <a:rPr lang="en-US" altLang="zh-CN" sz="2400" dirty="0" err="1">
-                <a:solidFill>
-                  <a:schemeClr val="bg1"/>
-                </a:solidFill>
-                <a:latin typeface="Times New Roman"/>
-              </a:rPr>
-              <a:t>sockaddr</a:t>
-            </a:r>
-            <a:r>
-              <a:rPr lang="en-US" altLang="zh-CN" sz="2400" dirty="0">
-                <a:solidFill>
-                  <a:schemeClr val="bg1"/>
-                </a:solidFill>
-                <a:latin typeface="Times New Roman"/>
-              </a:rPr>
-              <a:t> </a:t>
-            </a:r>
-            <a:r>
-              <a:rPr lang="zh-CN" altLang="en-US" sz="2400" baseline="-25000" dirty="0">
-                <a:solidFill>
-                  <a:schemeClr val="bg1"/>
-                </a:solidFill>
-                <a:latin typeface="Times New Roman"/>
-              </a:rPr>
-              <a:t>*</a:t>
-            </a:r>
-            <a:r>
-              <a:rPr lang="en-US" altLang="zh-CN" sz="2400" dirty="0">
-                <a:solidFill>
-                  <a:schemeClr val="bg1"/>
-                </a:solidFill>
-                <a:latin typeface="Times New Roman"/>
-              </a:rPr>
-              <a:t>, </a:t>
-            </a:r>
-            <a:r>
-              <a:rPr lang="en-US" altLang="zh-CN" sz="2400" dirty="0" err="1">
-                <a:solidFill>
-                  <a:schemeClr val="bg1"/>
-                </a:solidFill>
-                <a:latin typeface="Times New Roman"/>
-              </a:rPr>
-              <a:t>int</a:t>
-            </a:r>
-            <a:r>
-              <a:rPr lang="en-US" altLang="zh-CN" sz="2400" dirty="0">
-                <a:solidFill>
-                  <a:schemeClr val="bg1"/>
-                </a:solidFill>
-                <a:latin typeface="Times New Roman"/>
-              </a:rPr>
-              <a:t> </a:t>
-            </a:r>
-            <a:r>
-              <a:rPr lang="en-US" altLang="zh-CN" sz="2400" dirty="0" err="1">
-                <a:solidFill>
-                  <a:schemeClr val="bg1"/>
-                </a:solidFill>
-                <a:latin typeface="Times New Roman"/>
-              </a:rPr>
-              <a:t>addrlen</a:t>
-            </a:r>
-            <a:r>
-              <a:rPr lang="en-US" altLang="zh-CN" sz="2400" dirty="0">
-                <a:solidFill>
-                  <a:schemeClr val="bg1"/>
-                </a:solidFill>
-                <a:latin typeface="Times New Roman"/>
-              </a:rPr>
-              <a:t>); </a:t>
+              <a:t>size = write(s, data, 1024);</a:t>
             </a:r>
           </a:p>
         </p:txBody>
@@ -8098,7 +7927,7 @@
         <p:spPr>
           <a:xfrm>
             <a:off x="311150" y="3361572"/>
-            <a:ext cx="8737600" cy="1200329"/>
+            <a:ext cx="8737600" cy="461665"/>
           </a:xfrm>
           <a:prstGeom prst="rect">
             <a:avLst/>
@@ -8117,25 +7946,7 @@
                 </a:solidFill>
                 <a:latin typeface="Times New Roman"/>
               </a:rPr>
-              <a:t>客户端在建立套接字之后，不需要进行地址绑定就可以直接连接服务器。连接服务器的函数为</a:t>
-            </a:r>
-            <a:r>
-              <a:rPr lang="en-US" altLang="zh-CN" sz="2400" dirty="0">
-                <a:solidFill>
-                  <a:schemeClr val="bg1"/>
-                </a:solidFill>
-                <a:latin typeface="Times New Roman"/>
-              </a:rPr>
-              <a:t>connect()</a:t>
-            </a:r>
-            <a:r>
-              <a:rPr lang="zh-CN" altLang="en-US" sz="2400" dirty="0">
-                <a:solidFill>
-                  <a:schemeClr val="bg1"/>
-                </a:solidFill>
-                <a:latin typeface="Times New Roman"/>
-              </a:rPr>
-              <a:t>，此函数连接指定参数的服务器</a:t>
+              <a:t>对套接字进行写入的形式和过程与普通文件的操作方式一致</a:t>
             </a:r>
             <a:endParaRPr lang="zh-CN" altLang="en-US" sz="2400" dirty="0">
               <a:solidFill>
@@ -8148,7 +7959,7 @@
     </p:spTree>
     <p:extLst>
       <p:ext uri="{BB962C8B-B14F-4D97-AF65-F5344CB8AC3E}">
-        <p14:creationId xmlns:p14="http://schemas.microsoft.com/office/powerpoint/2010/main" val="1157919256"/>
+        <p14:creationId xmlns:p14="http://schemas.microsoft.com/office/powerpoint/2010/main" val="12634315"/>
       </p:ext>
     </p:extLst>
   </p:cSld>
@@ -8295,7 +8106,7 @@
         <p:spPr>
           <a:xfrm>
             <a:off x="2845837" y="830425"/>
-            <a:ext cx="3316934" cy="523220"/>
+            <a:ext cx="3196709" cy="523220"/>
           </a:xfrm>
           <a:prstGeom prst="rect">
             <a:avLst/>
@@ -8314,15 +8125,31 @@
                   <a:schemeClr val="bg1"/>
                 </a:solidFill>
               </a:rPr>
-              <a:t>写入数据函数</a:t>
-            </a:r>
-            <a:r>
-              <a:rPr lang="en-US" altLang="zh-CN" sz="2800" dirty="0">
-                <a:solidFill>
-                  <a:schemeClr val="bg1"/>
-                </a:solidFill>
-              </a:rPr>
-              <a:t>write()</a:t>
+              <a:t>写入数据</a:t>
+            </a:r>
+            <a:r>
+              <a:rPr lang="zh-CN" altLang="en-US" sz="2800" dirty="0" smtClean="0">
+                <a:solidFill>
+                  <a:schemeClr val="bg1"/>
+                </a:solidFill>
+              </a:rPr>
+              <a:t>函数</a:t>
+            </a:r>
+            <a:r>
+              <a:rPr lang="en-US" altLang="zh-CN" sz="2800" dirty="0" smtClean="0">
+                <a:solidFill>
+                  <a:schemeClr val="bg1"/>
+                </a:solidFill>
+              </a:rPr>
+              <a:t>read</a:t>
+            </a:r>
+            <a:r>
+              <a:rPr lang="en-US" altLang="zh-CN" sz="2800" dirty="0" smtClean="0">
+                <a:solidFill>
+                  <a:schemeClr val="bg1"/>
+                </a:solidFill>
+              </a:rPr>
+              <a:t>()</a:t>
             </a:r>
             <a:endParaRPr lang="en-US" altLang="zh-CN" sz="2800" dirty="0">
               <a:solidFill>
@@ -8394,7 +8221,7 @@
                 </a:solidFill>
                 <a:latin typeface="Times New Roman"/>
               </a:rPr>
-              <a:t>size = write(s, data, 1024);</a:t>
+              <a:t>size = read(s, data, 1024);</a:t>
             </a:r>
           </a:p>
         </p:txBody>
@@ -8427,7 +8254,25 @@
                 </a:solidFill>
                 <a:latin typeface="Times New Roman"/>
               </a:rPr>
-              <a:t>对套接字进行写入的形式和过程与普通文件的操作方式一致</a:t>
+              <a:t>对套接字</a:t>
+            </a:r>
+            <a:r>
+              <a:rPr lang="zh-CN" altLang="en-US" sz="2400" dirty="0" smtClean="0">
+                <a:solidFill>
+                  <a:schemeClr val="bg1"/>
+                </a:solidFill>
+                <a:latin typeface="Times New Roman"/>
+              </a:rPr>
+              <a:t>进行读取的</a:t>
+            </a:r>
+            <a:r>
+              <a:rPr lang="zh-CN" altLang="en-US" sz="2400" dirty="0">
+                <a:solidFill>
+                  <a:schemeClr val="bg1"/>
+                </a:solidFill>
+                <a:latin typeface="Times New Roman"/>
+              </a:rPr>
+              <a:t>形式和过程与普通文件的操作方式一致</a:t>
             </a:r>
             <a:endParaRPr lang="zh-CN" altLang="en-US" sz="2400" dirty="0">
               <a:solidFill>
@@ -8440,7 +8285,7 @@
     </p:spTree>
     <p:extLst>
       <p:ext uri="{BB962C8B-B14F-4D97-AF65-F5344CB8AC3E}">
-        <p14:creationId xmlns:p14="http://schemas.microsoft.com/office/powerpoint/2010/main" val="12634315"/>
+        <p14:creationId xmlns:p14="http://schemas.microsoft.com/office/powerpoint/2010/main" val="2021654847"/>
       </p:ext>
     </p:extLst>
   </p:cSld>
@@ -8627,7 +8472,7 @@
         <p:spPr>
           <a:xfrm>
             <a:off x="642938" y="1998474"/>
-            <a:ext cx="8405812" cy="830997"/>
+            <a:ext cx="8405812" cy="1200329"/>
           </a:xfrm>
           <a:prstGeom prst="rect">
             <a:avLst/>
@@ -8722,14 +8567,56 @@
                 </a:solidFill>
                 <a:latin typeface="Times New Roman"/>
               </a:rPr>
-              <a:t> how);</a:t>
-            </a:r>
-            <a:endParaRPr lang="zh-CN" altLang="en-US" sz="2400" dirty="0">
-              <a:solidFill>
-                <a:schemeClr val="bg1"/>
-              </a:solidFill>
-              <a:latin typeface="Times New Roman"/>
-            </a:endParaRPr>
+              <a:t> how</a:t>
+            </a:r>
+            <a:r>
+              <a:rPr lang="en-US" altLang="zh-CN" sz="2400" dirty="0" smtClean="0">
+                <a:solidFill>
+                  <a:schemeClr val="bg1"/>
+                </a:solidFill>
+                <a:latin typeface="Times New Roman"/>
+              </a:rPr>
+              <a:t>);</a:t>
+            </a:r>
+          </a:p>
+          <a:p>
+            <a:pPr marR="0" lvl="0" rtl="0"/>
+            <a:r>
+              <a:rPr lang="zh-CN" altLang="en-US" sz="2400" dirty="0" smtClean="0">
+                <a:solidFill>
+                  <a:schemeClr val="bg1"/>
+                </a:solidFill>
+                <a:latin typeface="Times New Roman"/>
+              </a:rPr>
+              <a:t>或者简单的</a:t>
+            </a:r>
+            <a:r>
+              <a:rPr lang="en-US" altLang="zh-CN" sz="2400" dirty="0" smtClean="0">
+                <a:solidFill>
+                  <a:schemeClr val="bg1"/>
+                </a:solidFill>
+                <a:latin typeface="Times New Roman"/>
+              </a:rPr>
+              <a:t>close(</a:t>
+            </a:r>
+            <a:r>
+              <a:rPr lang="en-US" altLang="zh-CN" sz="2400" dirty="0" err="1" smtClean="0">
+                <a:solidFill>
+                  <a:schemeClr val="bg1"/>
+                </a:solidFill>
+                <a:latin typeface="Times New Roman"/>
+              </a:rPr>
+              <a:t>int</a:t>
+            </a:r>
+            <a:r>
+              <a:rPr lang="en-US" altLang="zh-CN" sz="2400" dirty="0" smtClean="0">
+                <a:solidFill>
+                  <a:schemeClr val="bg1"/>
+                </a:solidFill>
+                <a:latin typeface="Times New Roman"/>
+              </a:rPr>
+              <a:t> s);</a:t>
+            </a:r>
           </a:p>
         </p:txBody>
       </p:sp>
@@ -9147,8 +9034,8 @@
         </p:nvSpPr>
         <p:spPr>
           <a:xfrm>
-            <a:off x="3352800" y="3454400"/>
-            <a:ext cx="2691763" cy="292388"/>
+            <a:off x="2114896" y="3306599"/>
+            <a:ext cx="5147563" cy="292388"/>
           </a:xfrm>
           <a:prstGeom prst="rect">
             <a:avLst/>
@@ -9186,12 +9073,60 @@
               <a:t>下载链接 ： </a:t>
             </a:r>
             <a:r>
-              <a:rPr kumimoji="1" lang="en-US" altLang="zh-CN" dirty="0" err="1" smtClean="0">
+              <a:rPr kumimoji="1" lang="mr-IN" altLang="zh-CN" dirty="0" err="1">
+                <a:solidFill>
+                  <a:schemeClr val="bg1"/>
+                </a:solidFill>
+              </a:rPr>
+              <a:t>https</a:t>
+            </a:r>
+            <a:r>
+              <a:rPr kumimoji="1" lang="mr-IN" altLang="zh-CN" dirty="0">
+                <a:solidFill>
+                  <a:schemeClr val="bg1"/>
+                </a:solidFill>
+              </a:rPr>
+              <a:t>://</a:t>
+            </a:r>
+            <a:r>
+              <a:rPr kumimoji="1" lang="mr-IN" altLang="zh-CN" dirty="0" err="1">
                 <a:solidFill>
                   <a:schemeClr val="bg1"/>
                 </a:solidFill>
               </a:rPr>
               <a:t>qfp-zjt.github.io</a:t>
+            </a:r>
+            <a:r>
+              <a:rPr kumimoji="1" lang="mr-IN" altLang="zh-CN" dirty="0">
+                <a:solidFill>
+                  <a:schemeClr val="bg1"/>
+                </a:solidFill>
+              </a:rPr>
+              <a:t>/2017/09/25/</a:t>
+            </a:r>
+            <a:r>
+              <a:rPr kumimoji="1" lang="zh-CN" altLang="mr-IN" dirty="0">
+                <a:solidFill>
+                  <a:schemeClr val="bg1"/>
+                </a:solidFill>
+              </a:rPr>
+              <a:t>资源下载</a:t>
+            </a:r>
+            <a:r>
+              <a:rPr kumimoji="1" lang="mr-IN" altLang="zh-CN" dirty="0">
+                <a:solidFill>
+                  <a:schemeClr val="bg1"/>
+                </a:solidFill>
+              </a:rPr>
+              <a:t>/#</a:t>
+            </a:r>
+            <a:r>
+              <a:rPr kumimoji="1" lang="mr-IN" altLang="zh-CN" dirty="0" err="1">
+                <a:solidFill>
+                  <a:schemeClr val="bg1"/>
+                </a:solidFill>
+              </a:rPr>
+              <a:t>more</a:t>
             </a:r>
             <a:endParaRPr kumimoji="1" lang="zh-CN" altLang="en-US" dirty="0">
               <a:solidFill>
@@ -10796,11 +10731,6 @@
               </a:rPr>
               <a:t>关闭套接字函数</a:t>
             </a:r>
-            <a:endParaRPr lang="zh-CN" altLang="en-US" sz="1800" dirty="0">
-              <a:solidFill>
-                <a:schemeClr val="bg1"/>
-              </a:solidFill>
-            </a:endParaRPr>
           </a:p>
         </p:txBody>
       </p:sp>
@@ -13949,11 +13879,6 @@
               </a:rPr>
               <a:t>bind()</a:t>
             </a:r>
-            <a:endParaRPr lang="en-US" altLang="zh-CN" sz="2400" dirty="0">
-              <a:solidFill>
-                <a:schemeClr val="bg1"/>
-              </a:solidFill>
-            </a:endParaRPr>
           </a:p>
         </p:txBody>
       </p:sp>
@@ -14527,7 +14452,7 @@
         <p:spPr>
           <a:xfrm>
             <a:off x="2845837" y="830425"/>
-            <a:ext cx="3706464" cy="461665"/>
+            <a:ext cx="2901756" cy="461665"/>
           </a:xfrm>
           <a:prstGeom prst="rect">
             <a:avLst/>
@@ -14546,7 +14471,7 @@
                   <a:schemeClr val="bg1"/>
                 </a:solidFill>
               </a:rPr>
-              <a:t>绑定一个地址端口对</a:t>
+              <a:t>监听本地端口</a:t>
             </a:r>
             <a:r>
               <a:rPr lang="en-US" altLang="zh-CN" sz="2400" dirty="0">
@@ -14554,13 +14479,8 @@
                   <a:schemeClr val="bg1"/>
                 </a:solidFill>
               </a:rPr>
-              <a:t>bind()</a:t>
-            </a:r>
-            <a:endParaRPr lang="en-US" altLang="zh-CN" sz="2400" dirty="0">
-              <a:solidFill>
-                <a:schemeClr val="bg1"/>
-              </a:solidFill>
-            </a:endParaRPr>
+              <a:t>listen()</a:t>
+            </a:r>
           </a:p>
         </p:txBody>
       </p:sp>
@@ -14573,7 +14493,7 @@
         <p:spPr>
           <a:xfrm>
             <a:off x="642938" y="1998474"/>
-            <a:ext cx="7612062" cy="1015663"/>
+            <a:ext cx="7612062" cy="830997"/>
           </a:xfrm>
           <a:prstGeom prst="rect">
             <a:avLst/>
@@ -14587,7 +14507,7 @@
           <a:p>
             <a:pPr marR="0" lvl="0" rtl="0"/>
             <a:r>
-              <a:rPr lang="en-US" altLang="zh-CN" sz="2000" dirty="0">
+              <a:rPr lang="en-US" altLang="zh-CN" sz="2400" dirty="0">
                 <a:solidFill>
                   <a:schemeClr val="bg1"/>
                 </a:solidFill>
@@ -14596,16 +14516,16 @@
               <a:t>#include &lt;sys/</a:t>
             </a:r>
             <a:r>
-              <a:rPr lang="en-US" altLang="zh-CN" sz="2000" dirty="0" err="1">
-                <a:solidFill>
-                  <a:schemeClr val="bg1"/>
-                </a:solidFill>
-                <a:latin typeface="Times New Roman"/>
-              </a:rPr>
-              <a:t>types.h</a:t>
-            </a:r>
-            <a:r>
-              <a:rPr lang="en-US" altLang="zh-CN" sz="2000" dirty="0">
+              <a:rPr lang="en-US" altLang="zh-CN" sz="2400" dirty="0" err="1">
+                <a:solidFill>
+                  <a:schemeClr val="bg1"/>
+                </a:solidFill>
+                <a:latin typeface="Times New Roman"/>
+              </a:rPr>
+              <a:t>socket.h</a:t>
+            </a:r>
+            <a:r>
+              <a:rPr lang="en-US" altLang="zh-CN" sz="2400" dirty="0">
                 <a:solidFill>
                   <a:schemeClr val="bg1"/>
                 </a:solidFill>
@@ -14617,37 +14537,7 @@
           <a:p>
             <a:pPr marR="0" lvl="0" rtl="0"/>
             <a:r>
-              <a:rPr lang="en-US" altLang="zh-CN" sz="2000" dirty="0">
-                <a:solidFill>
-                  <a:schemeClr val="bg1"/>
-                </a:solidFill>
-                <a:latin typeface="Times New Roman"/>
-              </a:rPr>
-              <a:t>#include &lt;sys/</a:t>
-            </a:r>
-            <a:r>
-              <a:rPr lang="en-US" altLang="zh-CN" sz="2000" dirty="0" err="1">
-                <a:solidFill>
-                  <a:schemeClr val="bg1"/>
-                </a:solidFill>
-                <a:latin typeface="Times New Roman"/>
-              </a:rPr>
-              <a:t>socket.h</a:t>
-            </a:r>
-            <a:r>
-              <a:rPr lang="en-US" altLang="zh-CN" sz="2000" dirty="0">
-                <a:solidFill>
-                  <a:schemeClr val="bg1"/>
-                </a:solidFill>
-                <a:latin typeface="Times New Roman"/>
-              </a:rPr>
-              <a:t>&gt;</a:t>
-            </a:r>
-          </a:p>
-          <a:p>
-            <a:pPr marR="0" lvl="0" rtl="0"/>
-            <a:r>
-              <a:rPr lang="en-US" altLang="zh-CN" sz="2000" dirty="0" err="1">
+              <a:rPr lang="sv-SE" altLang="zh-CN" sz="2400" dirty="0" err="1">
                 <a:solidFill>
                   <a:schemeClr val="bg1"/>
                 </a:solidFill>
@@ -14656,16 +14546,16 @@
               <a:t>int</a:t>
             </a:r>
             <a:r>
-              <a:rPr lang="en-US" altLang="zh-CN" sz="2000" dirty="0">
-                <a:solidFill>
-                  <a:schemeClr val="bg1"/>
-                </a:solidFill>
-                <a:latin typeface="Times New Roman"/>
-              </a:rPr>
-              <a:t> bind(</a:t>
-            </a:r>
-            <a:r>
-              <a:rPr lang="en-US" altLang="zh-CN" sz="2000" dirty="0" err="1">
+              <a:rPr lang="sv-SE" altLang="zh-CN" sz="2400" dirty="0">
+                <a:solidFill>
+                  <a:schemeClr val="bg1"/>
+                </a:solidFill>
+                <a:latin typeface="Times New Roman"/>
+              </a:rPr>
+              <a:t> listen(</a:t>
+            </a:r>
+            <a:r>
+              <a:rPr lang="sv-SE" altLang="zh-CN" sz="2400" dirty="0" err="1">
                 <a:solidFill>
                   <a:schemeClr val="bg1"/>
                 </a:solidFill>
@@ -14674,7 +14564,7 @@
               <a:t>int</a:t>
             </a:r>
             <a:r>
-              <a:rPr lang="en-US" altLang="zh-CN" sz="2000" dirty="0">
+              <a:rPr lang="sv-SE" altLang="zh-CN" sz="2400" dirty="0">
                 <a:solidFill>
                   <a:schemeClr val="bg1"/>
                 </a:solidFill>
@@ -14683,7 +14573,7 @@
               <a:t> </a:t>
             </a:r>
             <a:r>
-              <a:rPr lang="en-US" altLang="zh-CN" sz="2000" dirty="0" err="1">
+              <a:rPr lang="sv-SE" altLang="zh-CN" sz="2400" dirty="0" err="1">
                 <a:solidFill>
                   <a:schemeClr val="bg1"/>
                 </a:solidFill>
@@ -14692,7 +14582,7 @@
               <a:t>sockfd</a:t>
             </a:r>
             <a:r>
-              <a:rPr lang="en-US" altLang="zh-CN" sz="2000" dirty="0">
+              <a:rPr lang="sv-SE" altLang="zh-CN" sz="2400" dirty="0">
                 <a:solidFill>
                   <a:schemeClr val="bg1"/>
                 </a:solidFill>
@@ -14701,16 +14591,16 @@
               <a:t>, </a:t>
             </a:r>
             <a:r>
-              <a:rPr lang="en-US" altLang="zh-CN" sz="2000" dirty="0" err="1">
-                <a:solidFill>
-                  <a:schemeClr val="bg1"/>
-                </a:solidFill>
-                <a:latin typeface="Times New Roman"/>
-              </a:rPr>
-              <a:t>const</a:t>
-            </a:r>
-            <a:r>
-              <a:rPr lang="en-US" altLang="zh-CN" sz="2000" dirty="0">
+              <a:rPr lang="sv-SE" altLang="zh-CN" sz="2400" dirty="0" err="1">
+                <a:solidFill>
+                  <a:schemeClr val="bg1"/>
+                </a:solidFill>
+                <a:latin typeface="Times New Roman"/>
+              </a:rPr>
+              <a:t>int</a:t>
+            </a:r>
+            <a:r>
+              <a:rPr lang="sv-SE" altLang="zh-CN" sz="2400" dirty="0">
                 <a:solidFill>
                   <a:schemeClr val="bg1"/>
                 </a:solidFill>
@@ -14719,97 +14609,16 @@
               <a:t> </a:t>
             </a:r>
             <a:r>
-              <a:rPr lang="en-US" altLang="zh-CN" sz="2000" dirty="0" err="1">
-                <a:solidFill>
-                  <a:schemeClr val="bg1"/>
-                </a:solidFill>
-                <a:latin typeface="Times New Roman"/>
-              </a:rPr>
-              <a:t>struct</a:t>
-            </a:r>
-            <a:r>
-              <a:rPr lang="en-US" altLang="zh-CN" sz="2000" dirty="0">
-                <a:solidFill>
-                  <a:schemeClr val="bg1"/>
-                </a:solidFill>
-                <a:latin typeface="Times New Roman"/>
-              </a:rPr>
-              <a:t> </a:t>
-            </a:r>
-            <a:r>
-              <a:rPr lang="en-US" altLang="zh-CN" sz="2000" dirty="0" err="1">
-                <a:solidFill>
-                  <a:schemeClr val="bg1"/>
-                </a:solidFill>
-                <a:latin typeface="Times New Roman"/>
-              </a:rPr>
-              <a:t>sockaddr</a:t>
-            </a:r>
-            <a:r>
-              <a:rPr lang="en-US" altLang="zh-CN" sz="2000" dirty="0">
-                <a:solidFill>
-                  <a:schemeClr val="bg1"/>
-                </a:solidFill>
-                <a:latin typeface="Times New Roman"/>
-              </a:rPr>
-              <a:t> </a:t>
-            </a:r>
-            <a:r>
-              <a:rPr lang="zh-CN" altLang="en-US" sz="2000" baseline="-25000" dirty="0">
-                <a:solidFill>
-                  <a:schemeClr val="bg1"/>
-                </a:solidFill>
-                <a:latin typeface="Times New Roman"/>
-              </a:rPr>
-              <a:t>*</a:t>
-            </a:r>
-            <a:r>
-              <a:rPr lang="en-US" altLang="zh-CN" sz="2000" dirty="0" err="1">
-                <a:solidFill>
-                  <a:schemeClr val="bg1"/>
-                </a:solidFill>
-                <a:latin typeface="Times New Roman"/>
-              </a:rPr>
-              <a:t>my_addr</a:t>
-            </a:r>
-            <a:r>
-              <a:rPr lang="en-US" altLang="zh-CN" sz="2000" dirty="0">
-                <a:solidFill>
-                  <a:schemeClr val="bg1"/>
-                </a:solidFill>
-                <a:latin typeface="Times New Roman"/>
-              </a:rPr>
-              <a:t>, </a:t>
-            </a:r>
-            <a:r>
-              <a:rPr lang="en-US" altLang="zh-CN" sz="2000" dirty="0" err="1">
-                <a:solidFill>
-                  <a:schemeClr val="bg1"/>
-                </a:solidFill>
-                <a:latin typeface="Times New Roman"/>
-              </a:rPr>
-              <a:t>socklen_t</a:t>
-            </a:r>
-            <a:r>
-              <a:rPr lang="en-US" altLang="zh-CN" sz="2000" dirty="0">
-                <a:solidFill>
-                  <a:schemeClr val="bg1"/>
-                </a:solidFill>
-                <a:latin typeface="Times New Roman"/>
-              </a:rPr>
-              <a:t> </a:t>
-            </a:r>
-            <a:r>
-              <a:rPr lang="en-US" altLang="zh-CN" sz="2000" dirty="0" err="1">
-                <a:solidFill>
-                  <a:schemeClr val="bg1"/>
-                </a:solidFill>
-                <a:latin typeface="Times New Roman"/>
-              </a:rPr>
-              <a:t>addrlen</a:t>
-            </a:r>
-            <a:r>
-              <a:rPr lang="en-US" altLang="zh-CN" sz="2000" dirty="0">
+              <a:rPr lang="sv-SE" altLang="zh-CN" sz="2400" dirty="0" err="1">
+                <a:solidFill>
+                  <a:schemeClr val="bg1"/>
+                </a:solidFill>
+                <a:latin typeface="Times New Roman"/>
+              </a:rPr>
+              <a:t>backlog</a:t>
+            </a:r>
+            <a:r>
+              <a:rPr lang="sv-SE" altLang="zh-CN" sz="2400" dirty="0">
                 <a:solidFill>
                   <a:schemeClr val="bg1"/>
                 </a:solidFill>
@@ -14817,6 +14626,12 @@
               </a:rPr>
               <a:t>);</a:t>
             </a:r>
+            <a:endParaRPr lang="zh-CN" altLang="en-US" sz="2400" dirty="0">
+              <a:solidFill>
+                <a:schemeClr val="bg1"/>
+              </a:solidFill>
+              <a:latin typeface="Times New Roman"/>
+            </a:endParaRPr>
           </a:p>
         </p:txBody>
       </p:sp>
@@ -14828,8 +14643,8 @@
         </p:nvSpPr>
         <p:spPr>
           <a:xfrm>
-            <a:off x="838200" y="3374272"/>
-            <a:ext cx="7150100" cy="1015663"/>
+            <a:off x="311150" y="3361572"/>
+            <a:ext cx="8737600" cy="1200329"/>
           </a:xfrm>
           <a:prstGeom prst="rect">
             <a:avLst/>
@@ -14842,34 +14657,42 @@
           <a:lstStyle/>
           <a:p>
             <a:r>
-              <a:rPr lang="en-US" altLang="zh-CN" sz="2000" dirty="0">
-                <a:solidFill>
-                  <a:schemeClr val="bg1"/>
-                </a:solidFill>
-                <a:latin typeface="Times New Roman"/>
-              </a:rPr>
-              <a:t>bind()</a:t>
-            </a:r>
-            <a:r>
-              <a:rPr lang="zh-CN" altLang="en-US" sz="2000" dirty="0">
-                <a:solidFill>
-                  <a:schemeClr val="bg1"/>
-                </a:solidFill>
-                <a:latin typeface="Times New Roman"/>
-              </a:rPr>
-              <a:t>函数将长度为</a:t>
-            </a:r>
-            <a:r>
-              <a:rPr lang="en-US" altLang="zh-CN" sz="2000" dirty="0" err="1">
-                <a:solidFill>
-                  <a:schemeClr val="bg1"/>
-                </a:solidFill>
-                <a:latin typeface="Times New Roman"/>
-              </a:rPr>
-              <a:t>addlen</a:t>
-            </a:r>
-            <a:r>
-              <a:rPr lang="zh-CN" altLang="en-US" sz="2000" dirty="0">
+              <a:rPr lang="zh-CN" altLang="en-US" sz="2400" dirty="0">
+                <a:solidFill>
+                  <a:schemeClr val="bg1"/>
+                </a:solidFill>
+                <a:latin typeface="Times New Roman"/>
+              </a:rPr>
+              <a:t>当多个客户端的连接请求同时到来的时候，服务器并不是同时处理，而是将不能处理的客户端连接请求放到等待队列</a:t>
+            </a:r>
+            <a:r>
+              <a:rPr lang="zh-CN" altLang="en-US" sz="2400" dirty="0" smtClean="0">
+                <a:solidFill>
+                  <a:schemeClr val="bg1"/>
+                </a:solidFill>
+                <a:latin typeface="Times New Roman"/>
+              </a:rPr>
+              <a:t>中</a:t>
+            </a:r>
+            <a:endParaRPr lang="en-US" altLang="zh-CN" sz="2400" dirty="0" smtClean="0">
+              <a:solidFill>
+                <a:schemeClr val="bg1"/>
+              </a:solidFill>
+              <a:latin typeface="Times New Roman"/>
+            </a:endParaRPr>
+          </a:p>
+          <a:p>
+            <a:r>
+              <a:rPr lang="zh-CN" altLang="en-US" sz="2400" dirty="0" smtClean="0">
+                <a:solidFill>
+                  <a:schemeClr val="bg1"/>
+                </a:solidFill>
+                <a:latin typeface="Times New Roman"/>
+              </a:rPr>
+              <a:t>其中</a:t>
+            </a:r>
+            <a:r>
+              <a:rPr lang="zh-CN" altLang="en-US" sz="2400" dirty="0">
                 <a:solidFill>
                   <a:schemeClr val="bg1"/>
                 </a:solidFill>
@@ -14878,105 +14701,24 @@
               <a:t>的</a:t>
             </a:r>
             <a:r>
-              <a:rPr lang="en-US" altLang="zh-CN" sz="2000" dirty="0" err="1">
-                <a:solidFill>
-                  <a:schemeClr val="bg1"/>
-                </a:solidFill>
-                <a:latin typeface="Times New Roman"/>
-              </a:rPr>
-              <a:t>struct</a:t>
-            </a:r>
-            <a:r>
-              <a:rPr lang="en-US" altLang="zh-CN" sz="2000" dirty="0">
-                <a:solidFill>
-                  <a:schemeClr val="bg1"/>
-                </a:solidFill>
-                <a:latin typeface="Times New Roman"/>
-              </a:rPr>
-              <a:t> </a:t>
-            </a:r>
-            <a:r>
-              <a:rPr lang="en-US" altLang="zh-CN" sz="2000" dirty="0" err="1">
-                <a:solidFill>
-                  <a:schemeClr val="bg1"/>
-                </a:solidFill>
-                <a:latin typeface="Times New Roman"/>
-              </a:rPr>
-              <a:t>sockadd</a:t>
-            </a:r>
-            <a:r>
-              <a:rPr lang="zh-CN" altLang="en-US" sz="2000" dirty="0">
-                <a:solidFill>
-                  <a:schemeClr val="bg1"/>
-                </a:solidFill>
-                <a:latin typeface="Times New Roman"/>
-              </a:rPr>
-              <a:t>类型的参数</a:t>
-            </a:r>
-            <a:r>
-              <a:rPr lang="en-US" altLang="zh-CN" sz="2000" dirty="0" err="1">
-                <a:solidFill>
-                  <a:schemeClr val="bg1"/>
-                </a:solidFill>
-                <a:latin typeface="Times New Roman"/>
-              </a:rPr>
-              <a:t>my_addr</a:t>
-            </a:r>
-            <a:r>
-              <a:rPr lang="zh-CN" altLang="en-US" sz="2000" dirty="0">
-                <a:solidFill>
-                  <a:schemeClr val="bg1"/>
-                </a:solidFill>
-                <a:latin typeface="Times New Roman"/>
-              </a:rPr>
-              <a:t>与</a:t>
-            </a:r>
-            <a:r>
-              <a:rPr lang="en-US" altLang="zh-CN" sz="2000" dirty="0" err="1">
-                <a:solidFill>
-                  <a:schemeClr val="bg1"/>
-                </a:solidFill>
-                <a:latin typeface="Times New Roman"/>
-              </a:rPr>
-              <a:t>sockfd</a:t>
-            </a:r>
-            <a:r>
-              <a:rPr lang="zh-CN" altLang="en-US" sz="2000" dirty="0">
-                <a:solidFill>
-                  <a:schemeClr val="bg1"/>
-                </a:solidFill>
-                <a:latin typeface="Times New Roman"/>
-              </a:rPr>
-              <a:t>绑定在一起，将</a:t>
-            </a:r>
-            <a:r>
-              <a:rPr lang="en-US" altLang="zh-CN" sz="2000" dirty="0" err="1">
-                <a:solidFill>
-                  <a:schemeClr val="bg1"/>
-                </a:solidFill>
-                <a:latin typeface="Times New Roman"/>
-              </a:rPr>
-              <a:t>sockfd</a:t>
-            </a:r>
-            <a:r>
-              <a:rPr lang="zh-CN" altLang="en-US" sz="2000" dirty="0">
-                <a:solidFill>
-                  <a:schemeClr val="bg1"/>
-                </a:solidFill>
-                <a:latin typeface="Times New Roman"/>
-              </a:rPr>
-              <a:t>绑定到某个端口</a:t>
-            </a:r>
-            <a:r>
-              <a:rPr lang="zh-CN" altLang="en-US" sz="2000" dirty="0" smtClean="0">
-                <a:solidFill>
-                  <a:schemeClr val="bg1"/>
-                </a:solidFill>
-                <a:latin typeface="Times New Roman"/>
-              </a:rPr>
-              <a:t>上，该函数用于服务器端</a:t>
-            </a:r>
-            <a:endParaRPr lang="zh-CN" altLang="en-US" sz="2000" dirty="0">
+              <a:rPr lang="en-US" altLang="zh-CN" sz="2400" dirty="0">
+                <a:solidFill>
+                  <a:schemeClr val="bg1"/>
+                </a:solidFill>
+                <a:latin typeface="Times New Roman"/>
+              </a:rPr>
+              <a:t>backlog</a:t>
+            </a:r>
+            <a:r>
+              <a:rPr lang="zh-CN" altLang="en-US" sz="2400" dirty="0">
+                <a:solidFill>
+                  <a:schemeClr val="bg1"/>
+                </a:solidFill>
+                <a:latin typeface="Times New Roman"/>
+              </a:rPr>
+              <a:t>表示等待队列的长度</a:t>
+            </a:r>
+            <a:endParaRPr lang="zh-CN" altLang="en-US" sz="2400" dirty="0">
               <a:solidFill>
                 <a:schemeClr val="bg1"/>
               </a:solidFill>
@@ -14987,7 +14729,7 @@
     </p:spTree>
     <p:extLst>
       <p:ext uri="{BB962C8B-B14F-4D97-AF65-F5344CB8AC3E}">
-        <p14:creationId xmlns:p14="http://schemas.microsoft.com/office/powerpoint/2010/main" val="1717110819"/>
+        <p14:creationId xmlns:p14="http://schemas.microsoft.com/office/powerpoint/2010/main" val="1363807556"/>
       </p:ext>
     </p:extLst>
   </p:cSld>
@@ -15134,7 +14876,7 @@
         <p:spPr>
           <a:xfrm>
             <a:off x="2845837" y="830425"/>
-            <a:ext cx="2901756" cy="461665"/>
+            <a:ext cx="3635932" cy="461665"/>
           </a:xfrm>
           <a:prstGeom prst="rect">
             <a:avLst/>
@@ -15153,7 +14895,7 @@
                   <a:schemeClr val="bg1"/>
                 </a:solidFill>
               </a:rPr>
-              <a:t>监听本地端口</a:t>
+              <a:t>接受一个网络请求</a:t>
             </a:r>
             <a:r>
               <a:rPr lang="en-US" altLang="zh-CN" sz="2400" dirty="0">
@@ -15161,13 +14903,8 @@
                   <a:schemeClr val="bg1"/>
                 </a:solidFill>
               </a:rPr>
-              <a:t>listen()</a:t>
-            </a:r>
-            <a:endParaRPr lang="en-US" altLang="zh-CN" sz="2400" dirty="0">
-              <a:solidFill>
-                <a:schemeClr val="bg1"/>
-              </a:solidFill>
-            </a:endParaRPr>
+              <a:t>accept()</a:t>
+            </a:r>
           </a:p>
         </p:txBody>
       </p:sp>
@@ -15180,7 +14917,7 @@
         <p:spPr>
           <a:xfrm>
             <a:off x="642938" y="1998474"/>
-            <a:ext cx="7612062" cy="830997"/>
+            <a:ext cx="8405812" cy="1200329"/>
           </a:xfrm>
           <a:prstGeom prst="rect">
             <a:avLst/>
@@ -15209,6 +14946,36 @@
                 </a:solidFill>
                 <a:latin typeface="Times New Roman"/>
               </a:rPr>
+              <a:t>types.h</a:t>
+            </a:r>
+            <a:r>
+              <a:rPr lang="en-US" altLang="zh-CN" sz="2400" dirty="0">
+                <a:solidFill>
+                  <a:schemeClr val="bg1"/>
+                </a:solidFill>
+                <a:latin typeface="Times New Roman"/>
+              </a:rPr>
+              <a:t>&gt;</a:t>
+            </a:r>
+          </a:p>
+          <a:p>
+            <a:pPr marR="0" lvl="0" rtl="0"/>
+            <a:r>
+              <a:rPr lang="en-US" altLang="zh-CN" sz="2400" dirty="0">
+                <a:solidFill>
+                  <a:schemeClr val="bg1"/>
+                </a:solidFill>
+                <a:latin typeface="Times New Roman"/>
+              </a:rPr>
+              <a:t>#include &lt;sys/</a:t>
+            </a:r>
+            <a:r>
+              <a:rPr lang="en-US" altLang="zh-CN" sz="2400" dirty="0" err="1">
+                <a:solidFill>
+                  <a:schemeClr val="bg1"/>
+                </a:solidFill>
+                <a:latin typeface="Times New Roman"/>
+              </a:rPr>
               <a:t>socket.h</a:t>
             </a:r>
             <a:r>
@@ -15224,7 +14991,7 @@
           <a:p>
             <a:pPr marR="0" lvl="0" rtl="0"/>
             <a:r>
-              <a:rPr lang="sv-SE" altLang="zh-CN" sz="2400" dirty="0" err="1">
+              <a:rPr lang="en-US" altLang="zh-CN" sz="2400" dirty="0" err="1">
                 <a:solidFill>
                   <a:schemeClr val="bg1"/>
                 </a:solidFill>
@@ -15233,16 +15000,16 @@
               <a:t>int</a:t>
             </a:r>
             <a:r>
-              <a:rPr lang="sv-SE" altLang="zh-CN" sz="2400" dirty="0">
-                <a:solidFill>
-                  <a:schemeClr val="bg1"/>
-                </a:solidFill>
-                <a:latin typeface="Times New Roman"/>
-              </a:rPr>
-              <a:t> listen(</a:t>
-            </a:r>
-            <a:r>
-              <a:rPr lang="sv-SE" altLang="zh-CN" sz="2400" dirty="0" err="1">
+              <a:rPr lang="en-US" altLang="zh-CN" sz="2400" dirty="0">
+                <a:solidFill>
+                  <a:schemeClr val="bg1"/>
+                </a:solidFill>
+                <a:latin typeface="Times New Roman"/>
+              </a:rPr>
+              <a:t> accept(</a:t>
+            </a:r>
+            <a:r>
+              <a:rPr lang="en-US" altLang="zh-CN" sz="2400" dirty="0" err="1">
                 <a:solidFill>
                   <a:schemeClr val="bg1"/>
                 </a:solidFill>
@@ -15251,7 +15018,7 @@
               <a:t>int</a:t>
             </a:r>
             <a:r>
-              <a:rPr lang="sv-SE" altLang="zh-CN" sz="2400" dirty="0">
+              <a:rPr lang="en-US" altLang="zh-CN" sz="2400" dirty="0">
                 <a:solidFill>
                   <a:schemeClr val="bg1"/>
                 </a:solidFill>
@@ -15260,7 +15027,7 @@
               <a:t> </a:t>
             </a:r>
             <a:r>
-              <a:rPr lang="sv-SE" altLang="zh-CN" sz="2400" dirty="0" err="1">
+              <a:rPr lang="en-US" altLang="zh-CN" sz="2400" dirty="0" err="1">
                 <a:solidFill>
                   <a:schemeClr val="bg1"/>
                 </a:solidFill>
@@ -15269,7 +15036,7 @@
               <a:t>sockfd</a:t>
             </a:r>
             <a:r>
-              <a:rPr lang="sv-SE" altLang="zh-CN" sz="2400" dirty="0">
+              <a:rPr lang="en-US" altLang="zh-CN" sz="2400" dirty="0">
                 <a:solidFill>
                   <a:schemeClr val="bg1"/>
                 </a:solidFill>
@@ -15278,16 +15045,16 @@
               <a:t>, </a:t>
             </a:r>
             <a:r>
-              <a:rPr lang="sv-SE" altLang="zh-CN" sz="2400" dirty="0" err="1">
-                <a:solidFill>
-                  <a:schemeClr val="bg1"/>
-                </a:solidFill>
-                <a:latin typeface="Times New Roman"/>
-              </a:rPr>
-              <a:t>int</a:t>
-            </a:r>
-            <a:r>
-              <a:rPr lang="sv-SE" altLang="zh-CN" sz="2400" dirty="0">
+              <a:rPr lang="en-US" altLang="zh-CN" sz="2400" dirty="0" err="1">
+                <a:solidFill>
+                  <a:schemeClr val="bg1"/>
+                </a:solidFill>
+                <a:latin typeface="Times New Roman"/>
+              </a:rPr>
+              <a:t>struct</a:t>
+            </a:r>
+            <a:r>
+              <a:rPr lang="en-US" altLang="zh-CN" sz="2400" dirty="0">
                 <a:solidFill>
                   <a:schemeClr val="bg1"/>
                 </a:solidFill>
@@ -15296,22 +15063,94 @@
               <a:t> </a:t>
             </a:r>
             <a:r>
-              <a:rPr lang="sv-SE" altLang="zh-CN" sz="2400" dirty="0" err="1">
-                <a:solidFill>
-                  <a:schemeClr val="bg1"/>
-                </a:solidFill>
-                <a:latin typeface="Times New Roman"/>
-              </a:rPr>
-              <a:t>backlog</a:t>
-            </a:r>
-            <a:r>
-              <a:rPr lang="sv-SE" altLang="zh-CN" sz="2400" dirty="0">
-                <a:solidFill>
-                  <a:schemeClr val="bg1"/>
-                </a:solidFill>
-                <a:latin typeface="Times New Roman"/>
-              </a:rPr>
-              <a:t>);</a:t>
+              <a:rPr lang="en-US" altLang="zh-CN" sz="2400" dirty="0" err="1">
+                <a:solidFill>
+                  <a:schemeClr val="bg1"/>
+                </a:solidFill>
+                <a:latin typeface="Times New Roman"/>
+              </a:rPr>
+              <a:t>sockaddr</a:t>
+            </a:r>
+            <a:r>
+              <a:rPr lang="en-US" altLang="zh-CN" sz="2400" dirty="0">
+                <a:solidFill>
+                  <a:schemeClr val="bg1"/>
+                </a:solidFill>
+                <a:latin typeface="Times New Roman"/>
+              </a:rPr>
+              <a:t> </a:t>
+            </a:r>
+            <a:r>
+              <a:rPr lang="zh-CN" altLang="en-US" sz="2400" baseline="-25000" dirty="0">
+                <a:solidFill>
+                  <a:schemeClr val="bg1"/>
+                </a:solidFill>
+                <a:latin typeface="Times New Roman"/>
+              </a:rPr>
+              <a:t>*</a:t>
+            </a:r>
+            <a:r>
+              <a:rPr lang="en-US" altLang="zh-CN" sz="2400" dirty="0" err="1">
+                <a:solidFill>
+                  <a:schemeClr val="bg1"/>
+                </a:solidFill>
+                <a:latin typeface="Times New Roman"/>
+              </a:rPr>
+              <a:t>addr</a:t>
+            </a:r>
+            <a:r>
+              <a:rPr lang="en-US" altLang="zh-CN" sz="2400" dirty="0">
+                <a:solidFill>
+                  <a:schemeClr val="bg1"/>
+                </a:solidFill>
+                <a:latin typeface="Times New Roman"/>
+              </a:rPr>
+              <a:t>, </a:t>
+            </a:r>
+            <a:r>
+              <a:rPr lang="en-US" altLang="zh-CN" sz="2400" dirty="0" err="1">
+                <a:solidFill>
+                  <a:schemeClr val="bg1"/>
+                </a:solidFill>
+                <a:latin typeface="Times New Roman"/>
+              </a:rPr>
+              <a:t>socklen_t</a:t>
+            </a:r>
+            <a:r>
+              <a:rPr lang="en-US" altLang="zh-CN" sz="2400" dirty="0">
+                <a:solidFill>
+                  <a:schemeClr val="bg1"/>
+                </a:solidFill>
+                <a:latin typeface="Times New Roman"/>
+              </a:rPr>
+              <a:t> </a:t>
+            </a:r>
+            <a:r>
+              <a:rPr lang="zh-CN" altLang="en-US" sz="2400" baseline="-25000" dirty="0">
+                <a:solidFill>
+                  <a:schemeClr val="bg1"/>
+                </a:solidFill>
+                <a:latin typeface="Times New Roman"/>
+              </a:rPr>
+              <a:t>*</a:t>
+            </a:r>
+            <a:r>
+              <a:rPr lang="en-US" altLang="zh-CN" sz="2400" dirty="0" err="1">
+                <a:solidFill>
+                  <a:schemeClr val="bg1"/>
+                </a:solidFill>
+                <a:latin typeface="Times New Roman"/>
+              </a:rPr>
+              <a:t>addrlen</a:t>
+            </a:r>
+            <a:r>
+              <a:rPr lang="en-US" altLang="zh-CN" sz="2400" dirty="0">
+                <a:solidFill>
+                  <a:schemeClr val="bg1"/>
+                </a:solidFill>
+                <a:latin typeface="Times New Roman"/>
+              </a:rPr>
+              <a:t>); </a:t>
             </a:r>
             <a:endParaRPr lang="zh-CN" altLang="en-US" sz="2400" dirty="0">
               <a:solidFill>
@@ -15344,66 +15183,46 @@
           <a:lstStyle/>
           <a:p>
             <a:r>
+              <a:rPr lang="zh-CN" altLang="en-US" sz="2400" dirty="0" smtClean="0">
+                <a:solidFill>
+                  <a:schemeClr val="bg1"/>
+                </a:solidFill>
+              </a:rPr>
+              <a:t>当客户端连接服务器端，会被放到一个请求队列中，</a:t>
+            </a:r>
+            <a:r>
+              <a:rPr lang="en-US" altLang="zh-CN" sz="2400" dirty="0" smtClean="0">
+                <a:solidFill>
+                  <a:schemeClr val="bg1"/>
+                </a:solidFill>
+              </a:rPr>
+              <a:t>accept()</a:t>
+            </a:r>
+            <a:r>
+              <a:rPr lang="zh-CN" altLang="en-US" sz="2400" dirty="0" smtClean="0">
+                <a:solidFill>
+                  <a:schemeClr val="bg1"/>
+                </a:solidFill>
+              </a:rPr>
+              <a:t>函数的主要功能是：</a:t>
+            </a:r>
+            <a:r>
+              <a:rPr lang="zh-CN" altLang="en-US" sz="2400" dirty="0" smtClean="0">
+                <a:solidFill>
+                  <a:schemeClr val="bg1"/>
+                </a:solidFill>
+                <a:latin typeface="Times New Roman"/>
+              </a:rPr>
+              <a:t>会从请求队列中，返回</a:t>
+            </a:r>
+            <a:r>
               <a:rPr lang="zh-CN" altLang="en-US" sz="2400" dirty="0">
                 <a:solidFill>
                   <a:schemeClr val="bg1"/>
                 </a:solidFill>
                 <a:latin typeface="Times New Roman"/>
               </a:rPr>
-              <a:t>当多个客户端的连接请求同时到来的时候，服务器并不是同时处理，而是将不能处理的客户端连接请求放到等待队列</a:t>
-            </a:r>
-            <a:r>
-              <a:rPr lang="zh-CN" altLang="en-US" sz="2400" dirty="0" smtClean="0">
-                <a:solidFill>
-                  <a:schemeClr val="bg1"/>
-                </a:solidFill>
-                <a:latin typeface="Times New Roman"/>
-              </a:rPr>
-              <a:t>中</a:t>
-            </a:r>
-            <a:endParaRPr lang="en-US" altLang="zh-CN" sz="2400" dirty="0" smtClean="0">
-              <a:solidFill>
-                <a:schemeClr val="bg1"/>
-              </a:solidFill>
-              <a:latin typeface="Times New Roman"/>
-            </a:endParaRPr>
-          </a:p>
-          <a:p>
-            <a:r>
-              <a:rPr lang="zh-CN" altLang="en-US" sz="2400" dirty="0" smtClean="0">
-                <a:solidFill>
-                  <a:schemeClr val="bg1"/>
-                </a:solidFill>
-                <a:latin typeface="Times New Roman"/>
-              </a:rPr>
-              <a:t>其中</a:t>
-            </a:r>
-            <a:r>
-              <a:rPr lang="zh-CN" altLang="en-US" sz="2400" dirty="0">
-                <a:solidFill>
-                  <a:schemeClr val="bg1"/>
-                </a:solidFill>
-                <a:latin typeface="Times New Roman"/>
-              </a:rPr>
-              <a:t>的</a:t>
-            </a:r>
-            <a:r>
-              <a:rPr lang="en-US" altLang="zh-CN" sz="2400" dirty="0">
-                <a:solidFill>
-                  <a:schemeClr val="bg1"/>
-                </a:solidFill>
-                <a:latin typeface="Times New Roman"/>
-              </a:rPr>
-              <a:t>backlog</a:t>
-            </a:r>
-            <a:r>
-              <a:rPr lang="zh-CN" altLang="en-US" sz="2400" dirty="0">
-                <a:solidFill>
-                  <a:schemeClr val="bg1"/>
-                </a:solidFill>
-                <a:latin typeface="Times New Roman"/>
-              </a:rPr>
-              <a:t>表示等待队列的长度</a:t>
+              <a:t>一个新的套接字文件描述符来表示客户端的连接</a:t>
             </a:r>
             <a:endParaRPr lang="zh-CN" altLang="en-US" sz="2400" dirty="0">
               <a:solidFill>
@@ -15416,7 +15235,7 @@
     </p:spTree>
     <p:extLst>
       <p:ext uri="{BB962C8B-B14F-4D97-AF65-F5344CB8AC3E}">
-        <p14:creationId xmlns:p14="http://schemas.microsoft.com/office/powerpoint/2010/main" val="1363807556"/>
+        <p14:creationId xmlns:p14="http://schemas.microsoft.com/office/powerpoint/2010/main" val="1722709953"/>
       </p:ext>
     </p:extLst>
   </p:cSld>
@@ -15563,7 +15382,7 @@
         <p:spPr>
           <a:xfrm>
             <a:off x="2845837" y="830425"/>
-            <a:ext cx="3635932" cy="461665"/>
+            <a:ext cx="4115229" cy="461665"/>
           </a:xfrm>
           <a:prstGeom prst="rect">
             <a:avLst/>
@@ -15577,20 +15396,24 @@
           <a:lstStyle/>
           <a:p>
             <a:r>
-              <a:rPr lang="zh-CN" altLang="en-US" sz="2400" dirty="0">
-                <a:solidFill>
-                  <a:schemeClr val="bg1"/>
-                </a:solidFill>
-              </a:rPr>
-              <a:t>接受一个网络请求</a:t>
-            </a:r>
-            <a:r>
-              <a:rPr lang="en-US" altLang="zh-CN" sz="2400" dirty="0">
-                <a:solidFill>
-                  <a:schemeClr val="bg1"/>
-                </a:solidFill>
-              </a:rPr>
-              <a:t>accept()</a:t>
+              <a:rPr lang="zh-CN" altLang="en-US" sz="2400" kern="1800" dirty="0">
+                <a:solidFill>
+                  <a:schemeClr val="bg1"/>
+                </a:solidFill>
+                <a:latin typeface="Times New Roman"/>
+                <a:ea typeface="黑体"/>
+              </a:rPr>
+              <a:t>连接目标网络服务器</a:t>
+            </a:r>
+            <a:r>
+              <a:rPr lang="en-US" altLang="zh-CN" sz="2400" kern="1800" dirty="0">
+                <a:solidFill>
+                  <a:schemeClr val="bg1"/>
+                </a:solidFill>
+                <a:latin typeface="Times New Roman"/>
+                <a:ea typeface="黑体"/>
+              </a:rPr>
+              <a:t>connect()</a:t>
             </a:r>
             <a:endParaRPr lang="en-US" altLang="zh-CN" sz="2400" dirty="0">
               <a:solidFill>
@@ -15698,7 +15521,7 @@
                 </a:solidFill>
                 <a:latin typeface="Times New Roman"/>
               </a:rPr>
-              <a:t> accept(</a:t>
+              <a:t> connect(</a:t>
             </a:r>
             <a:r>
               <a:rPr lang="en-US" altLang="zh-CN" sz="2400" dirty="0" err="1">
@@ -15782,13 +15605,22 @@
               <a:t>*</a:t>
             </a:r>
             <a:r>
+              <a:rPr lang="en-US" altLang="zh-CN" sz="2400" dirty="0">
+                <a:solidFill>
+                  <a:schemeClr val="bg1"/>
+                </a:solidFill>
+                <a:latin typeface="Times New Roman"/>
+              </a:rPr>
+              <a:t>, </a:t>
+            </a:r>
+            <a:r>
               <a:rPr lang="en-US" altLang="zh-CN" sz="2400" dirty="0" err="1">
                 <a:solidFill>
                   <a:schemeClr val="bg1"/>
                 </a:solidFill>
                 <a:latin typeface="Times New Roman"/>
               </a:rPr>
-              <a:t>addr</a:t>
+              <a:t>int</a:t>
             </a:r>
             <a:r>
               <a:rPr lang="en-US" altLang="zh-CN" sz="2400" dirty="0">
@@ -15797,7 +15629,7 @@
                 </a:solidFill>
                 <a:latin typeface="Times New Roman"/>
               </a:rPr>
-              <a:t>, </a:t>
+              <a:t> </a:t>
             </a:r>
             <a:r>
               <a:rPr lang="en-US" altLang="zh-CN" sz="2400" dirty="0" err="1">
@@ -15806,7 +15638,7 @@
                 </a:solidFill>
                 <a:latin typeface="Times New Roman"/>
               </a:rPr>
-              <a:t>socklen_t</a:t>
+              <a:t>addrlen</a:t>
             </a:r>
             <a:r>
               <a:rPr lang="en-US" altLang="zh-CN" sz="2400" dirty="0">
@@ -15815,41 +15647,8 @@
                 </a:solidFill>
                 <a:latin typeface="Times New Roman"/>
               </a:rPr>
-              <a:t> </a:t>
-            </a:r>
-            <a:r>
-              <a:rPr lang="zh-CN" altLang="en-US" sz="2400" baseline="-25000" dirty="0">
-                <a:solidFill>
-                  <a:schemeClr val="bg1"/>
-                </a:solidFill>
-                <a:latin typeface="Times New Roman"/>
-              </a:rPr>
-              <a:t>*</a:t>
-            </a:r>
-            <a:r>
-              <a:rPr lang="en-US" altLang="zh-CN" sz="2400" dirty="0" err="1">
-                <a:solidFill>
-                  <a:schemeClr val="bg1"/>
-                </a:solidFill>
-                <a:latin typeface="Times New Roman"/>
-              </a:rPr>
-              <a:t>addrlen</a:t>
-            </a:r>
-            <a:r>
-              <a:rPr lang="en-US" altLang="zh-CN" sz="2400" dirty="0">
-                <a:solidFill>
-                  <a:schemeClr val="bg1"/>
-                </a:solidFill>
-                <a:latin typeface="Times New Roman"/>
-              </a:rPr>
               <a:t>); </a:t>
             </a:r>
-            <a:endParaRPr lang="zh-CN" altLang="en-US" sz="2400" dirty="0">
-              <a:solidFill>
-                <a:schemeClr val="bg1"/>
-              </a:solidFill>
-              <a:latin typeface="Times New Roman"/>
-            </a:endParaRPr>
           </a:p>
         </p:txBody>
       </p:sp>
@@ -15875,46 +15674,31 @@
           <a:lstStyle/>
           <a:p>
             <a:r>
-              <a:rPr lang="zh-CN" altLang="en-US" sz="2400" dirty="0" smtClean="0">
-                <a:solidFill>
-                  <a:schemeClr val="bg1"/>
-                </a:solidFill>
-              </a:rPr>
-              <a:t>当客户端连接服务器端，会被放到一个请求队列中，</a:t>
-            </a:r>
-            <a:r>
-              <a:rPr lang="en-US" altLang="zh-CN" sz="2400" dirty="0" smtClean="0">
-                <a:solidFill>
-                  <a:schemeClr val="bg1"/>
-                </a:solidFill>
-              </a:rPr>
-              <a:t>accept()</a:t>
-            </a:r>
-            <a:r>
-              <a:rPr lang="zh-CN" altLang="en-US" sz="2400" dirty="0" smtClean="0">
-                <a:solidFill>
-                  <a:schemeClr val="bg1"/>
-                </a:solidFill>
-              </a:rPr>
-              <a:t>函数的主要功能是：</a:t>
-            </a:r>
-            <a:r>
-              <a:rPr lang="zh-CN" altLang="en-US" sz="2400" dirty="0" smtClean="0">
-                <a:solidFill>
-                  <a:schemeClr val="bg1"/>
-                </a:solidFill>
-                <a:latin typeface="Times New Roman"/>
-              </a:rPr>
-              <a:t>会从请求队列中，返回</a:t>
-            </a:r>
-            <a:r>
               <a:rPr lang="zh-CN" altLang="en-US" sz="2400" dirty="0">
                 <a:solidFill>
                   <a:schemeClr val="bg1"/>
                 </a:solidFill>
                 <a:latin typeface="Times New Roman"/>
               </a:rPr>
-              <a:t>一个新的套接字文件描述符来表示客户端的连接</a:t>
+              <a:t>客户端在建立套接字之后，不需要进行地址绑定就可以直接连接服务器。连接服务器的函数为</a:t>
+            </a:r>
+            <a:r>
+              <a:rPr lang="en-US" altLang="zh-CN" sz="2400" dirty="0">
+                <a:solidFill>
+                  <a:schemeClr val="bg1"/>
+                </a:solidFill>
+                <a:latin typeface="Times New Roman"/>
+              </a:rPr>
+              <a:t>connect()</a:t>
+            </a:r>
+            <a:r>
+              <a:rPr lang="zh-CN" altLang="en-US" sz="2400" dirty="0">
+                <a:solidFill>
+                  <a:schemeClr val="bg1"/>
+                </a:solidFill>
+                <a:latin typeface="Times New Roman"/>
+              </a:rPr>
+              <a:t>，此函数连接指定参数的服务器</a:t>
             </a:r>
             <a:endParaRPr lang="zh-CN" altLang="en-US" sz="2400" dirty="0">
               <a:solidFill>
@@ -15927,7 +15711,7 @@
     </p:spTree>
     <p:extLst>
       <p:ext uri="{BB962C8B-B14F-4D97-AF65-F5344CB8AC3E}">
-        <p14:creationId xmlns:p14="http://schemas.microsoft.com/office/powerpoint/2010/main" val="1722709953"/>
+        <p14:creationId xmlns:p14="http://schemas.microsoft.com/office/powerpoint/2010/main" val="1157919256"/>
       </p:ext>
     </p:extLst>
   </p:cSld>

</xml_diff>